<commit_message>
Ajout du TP Linux
</commit_message>
<xml_diff>
--- a/ELK - docker compose - stock ms -.pptx
+++ b/ELK - docker compose - stock ms -.pptx
@@ -8,7 +8,9 @@
     <p:sldId id="256" r:id="rId2"/>
     <p:sldId id="257" r:id="rId3"/>
     <p:sldId id="258" r:id="rId4"/>
-    <p:sldId id="259" r:id="rId5"/>
+    <p:sldId id="260" r:id="rId5"/>
+    <p:sldId id="261" r:id="rId6"/>
+    <p:sldId id="259" r:id="rId7"/>
   </p:sldIdLst>
   <p:sldSz cx="12192000" cy="6858000"/>
   <p:notesSz cx="6858000" cy="9144000"/>
@@ -107,6 +109,11 @@
       </a:defRPr>
     </a:lvl9pPr>
   </p:defaultTextStyle>
+  <p:extLst>
+    <p:ext uri="{EFAFB233-063F-42B5-8137-9DF3F51BA10A}">
+      <p15:sldGuideLst xmlns:p15="http://schemas.microsoft.com/office/powerpoint/2012/main"/>
+    </p:ext>
+  </p:extLst>
 </p:presentation>
 </file>
 
@@ -6279,6 +6286,197 @@
           <a:bodyPr/>
           <a:lstStyle/>
           <a:p>
+            <a:r>
+              <a:rPr lang="fr-FR" dirty="0" smtClean="0"/>
+              <a:t>Démarrage de la </a:t>
+            </a:r>
+            <a:r>
+              <a:rPr lang="fr-FR" dirty="0" err="1" smtClean="0"/>
+              <a:t>stack</a:t>
+            </a:r>
+            <a:r>
+              <a:rPr lang="fr-FR" dirty="0" smtClean="0"/>
+              <a:t> ELK et stock-ms</a:t>
+            </a:r>
+            <a:endParaRPr lang="fr-FR" dirty="0"/>
+          </a:p>
+        </p:txBody>
+      </p:sp>
+      <p:sp>
+        <p:nvSpPr>
+          <p:cNvPr id="5" name="Espace réservé du contenu 4"/>
+          <p:cNvSpPr>
+            <a:spLocks noGrp="1"/>
+          </p:cNvSpPr>
+          <p:nvPr>
+            <p:ph idx="1"/>
+          </p:nvPr>
+        </p:nvSpPr>
+        <p:spPr/>
+        <p:txBody>
+          <a:bodyPr/>
+          <a:lstStyle/>
+          <a:p>
+            <a:endParaRPr lang="fr-FR"/>
+          </a:p>
+        </p:txBody>
+      </p:sp>
+      <p:pic>
+        <p:nvPicPr>
+          <p:cNvPr id="6" name="Image 5"/>
+          <p:cNvPicPr>
+            <a:picLocks noChangeAspect="1"/>
+          </p:cNvPicPr>
+          <p:nvPr/>
+        </p:nvPicPr>
+        <p:blipFill>
+          <a:blip r:embed="rId2"/>
+          <a:stretch>
+            <a:fillRect/>
+          </a:stretch>
+        </p:blipFill>
+        <p:spPr>
+          <a:xfrm>
+            <a:off x="1106248" y="2022680"/>
+            <a:ext cx="8943605" cy="4255955"/>
+          </a:xfrm>
+          <a:prstGeom prst="rect">
+            <a:avLst/>
+          </a:prstGeom>
+        </p:spPr>
+      </p:pic>
+    </p:spTree>
+    <p:extLst>
+      <p:ext uri="{BB962C8B-B14F-4D97-AF65-F5344CB8AC3E}">
+        <p14:creationId xmlns:p14="http://schemas.microsoft.com/office/powerpoint/2010/main" val="1659632757"/>
+      </p:ext>
+    </p:extLst>
+  </p:cSld>
+  <p:clrMapOvr>
+    <a:masterClrMapping/>
+  </p:clrMapOvr>
+</p:sld>
+</file>
+
+<file path=ppt/slides/slide5.xml><?xml version="1.0" encoding="utf-8"?>
+<p:sld xmlns:a="http://schemas.openxmlformats.org/drawingml/2006/main" xmlns:r="http://schemas.openxmlformats.org/officeDocument/2006/relationships" xmlns:p="http://schemas.openxmlformats.org/presentationml/2006/main">
+  <p:cSld>
+    <p:spTree>
+      <p:nvGrpSpPr>
+        <p:cNvPr id="1" name=""/>
+        <p:cNvGrpSpPr/>
+        <p:nvPr/>
+      </p:nvGrpSpPr>
+      <p:grpSpPr>
+        <a:xfrm>
+          <a:off x="0" y="0"/>
+          <a:ext cx="0" cy="0"/>
+          <a:chOff x="0" y="0"/>
+          <a:chExt cx="0" cy="0"/>
+        </a:xfrm>
+      </p:grpSpPr>
+      <p:sp>
+        <p:nvSpPr>
+          <p:cNvPr id="2" name="Titre 1"/>
+          <p:cNvSpPr>
+            <a:spLocks noGrp="1"/>
+          </p:cNvSpPr>
+          <p:nvPr>
+            <p:ph type="title"/>
+          </p:nvPr>
+        </p:nvSpPr>
+        <p:spPr/>
+        <p:txBody>
+          <a:bodyPr/>
+          <a:lstStyle/>
+          <a:p>
+            <a:r>
+              <a:rPr lang="fr-FR" b="1" dirty="0" smtClean="0"/>
+              <a:t>Visualisation </a:t>
+            </a:r>
+            <a:r>
+              <a:rPr lang="fr-FR" b="1" dirty="0"/>
+              <a:t>les logs dans </a:t>
+            </a:r>
+            <a:r>
+              <a:rPr lang="fr-FR" b="1" dirty="0" err="1"/>
+              <a:t>Kibana</a:t>
+            </a:r>
+            <a:endParaRPr lang="fr-FR" b="1" dirty="0"/>
+          </a:p>
+        </p:txBody>
+      </p:sp>
+      <p:pic>
+        <p:nvPicPr>
+          <p:cNvPr id="4" name="Espace réservé du contenu 3"/>
+          <p:cNvPicPr>
+            <a:picLocks noGrp="1" noChangeAspect="1"/>
+          </p:cNvPicPr>
+          <p:nvPr>
+            <p:ph idx="1"/>
+          </p:nvPr>
+        </p:nvPicPr>
+        <p:blipFill>
+          <a:blip r:embed="rId2"/>
+          <a:stretch>
+            <a:fillRect/>
+          </a:stretch>
+        </p:blipFill>
+        <p:spPr>
+          <a:xfrm>
+            <a:off x="1268820" y="2052638"/>
+            <a:ext cx="8616136" cy="4195762"/>
+          </a:xfrm>
+          <a:prstGeom prst="rect">
+            <a:avLst/>
+          </a:prstGeom>
+        </p:spPr>
+      </p:pic>
+    </p:spTree>
+    <p:extLst>
+      <p:ext uri="{BB962C8B-B14F-4D97-AF65-F5344CB8AC3E}">
+        <p14:creationId xmlns:p14="http://schemas.microsoft.com/office/powerpoint/2010/main" val="230549073"/>
+      </p:ext>
+    </p:extLst>
+  </p:cSld>
+  <p:clrMapOvr>
+    <a:masterClrMapping/>
+  </p:clrMapOvr>
+</p:sld>
+</file>
+
+<file path=ppt/slides/slide6.xml><?xml version="1.0" encoding="utf-8"?>
+<p:sld xmlns:a="http://schemas.openxmlformats.org/drawingml/2006/main" xmlns:r="http://schemas.openxmlformats.org/officeDocument/2006/relationships" xmlns:p="http://schemas.openxmlformats.org/presentationml/2006/main">
+  <p:cSld>
+    <p:spTree>
+      <p:nvGrpSpPr>
+        <p:cNvPr id="1" name=""/>
+        <p:cNvGrpSpPr/>
+        <p:nvPr/>
+      </p:nvGrpSpPr>
+      <p:grpSpPr>
+        <a:xfrm>
+          <a:off x="0" y="0"/>
+          <a:ext cx="0" cy="0"/>
+          <a:chOff x="0" y="0"/>
+          <a:chExt cx="0" cy="0"/>
+        </a:xfrm>
+      </p:grpSpPr>
+      <p:sp>
+        <p:nvSpPr>
+          <p:cNvPr id="2" name="Titre 1"/>
+          <p:cNvSpPr>
+            <a:spLocks noGrp="1"/>
+          </p:cNvSpPr>
+          <p:nvPr>
+            <p:ph type="title"/>
+          </p:nvPr>
+        </p:nvSpPr>
+        <p:spPr/>
+        <p:txBody>
+          <a:bodyPr/>
+          <a:lstStyle/>
+          <a:p>
             <a:endParaRPr lang="fr-FR"/>
           </a:p>
         </p:txBody>
@@ -6306,8 +6504,8 @@
         </p:blipFill>
         <p:spPr>
           <a:xfrm>
-            <a:off x="1103313" y="3480867"/>
-            <a:ext cx="8947150" cy="2026803"/>
+            <a:off x="1032610" y="3365370"/>
+            <a:ext cx="9914759" cy="2245996"/>
           </a:xfrm>
         </p:spPr>
       </p:pic>

</xml_diff>